<commit_message>
update with PSH Summit and extra code
</commit_message>
<xml_diff>
--- a/2019-04-27-PSH-Summit-Dont-Do-That/Dont-Do-That.pptx
+++ b/2019-04-27-PSH-Summit-Dont-Do-That/Dont-Do-That.pptx
@@ -219,7 +219,7 @@
           <a:p>
             <a:fld id="{58771B6E-14EC-440F-B577-C74BAD738206}" type="datetimeFigureOut">
               <a:rPr lang="en-GB" smtClean="0"/>
-              <a:t>21/04/2019</a:t>
+              <a:t>01/05/2019</a:t>
             </a:fld>
             <a:endParaRPr lang="en-GB"/>
           </a:p>
@@ -917,7 +917,7 @@
             <a:fld id="{B61BEF0D-F0BB-DE4B-95CE-6DB70DBA9567}" type="datetimeFigureOut">
               <a:rPr lang="en-US" smtClean="0"/>
               <a:pPr/>
-              <a:t>4/21/2019</a:t>
+              <a:t>5/1/2019</a:t>
             </a:fld>
             <a:endParaRPr lang="en-US" dirty="0"/>
           </a:p>
@@ -1497,7 +1497,7 @@
             <a:fld id="{B61BEF0D-F0BB-DE4B-95CE-6DB70DBA9567}" type="datetimeFigureOut">
               <a:rPr lang="en-US" smtClean="0"/>
               <a:pPr/>
-              <a:t>4/21/2019</a:t>
+              <a:t>5/1/2019</a:t>
             </a:fld>
             <a:endParaRPr lang="en-US" dirty="0"/>
           </a:p>
@@ -1739,7 +1739,7 @@
             <a:fld id="{B61BEF0D-F0BB-DE4B-95CE-6DB70DBA9567}" type="datetimeFigureOut">
               <a:rPr lang="en-US" smtClean="0"/>
               <a:pPr/>
-              <a:t>4/21/2019</a:t>
+              <a:t>5/1/2019</a:t>
             </a:fld>
             <a:endParaRPr lang="en-US" dirty="0"/>
           </a:p>
@@ -1995,7 +1995,7 @@
             <a:fld id="{B61BEF0D-F0BB-DE4B-95CE-6DB70DBA9567}" type="datetimeFigureOut">
               <a:rPr lang="en-US" smtClean="0"/>
               <a:pPr/>
-              <a:t>4/21/2019</a:t>
+              <a:t>5/1/2019</a:t>
             </a:fld>
             <a:endParaRPr lang="en-US" dirty="0"/>
           </a:p>
@@ -2356,7 +2356,7 @@
             <a:fld id="{B61BEF0D-F0BB-DE4B-95CE-6DB70DBA9567}" type="datetimeFigureOut">
               <a:rPr lang="en-US" smtClean="0"/>
               <a:pPr/>
-              <a:t>4/21/2019</a:t>
+              <a:t>5/1/2019</a:t>
             </a:fld>
             <a:endParaRPr lang="en-US" dirty="0"/>
           </a:p>
@@ -2470,7 +2470,7 @@
             <a:fld id="{B61BEF0D-F0BB-DE4B-95CE-6DB70DBA9567}" type="datetimeFigureOut">
               <a:rPr lang="en-US" smtClean="0"/>
               <a:pPr/>
-              <a:t>4/21/2019</a:t>
+              <a:t>5/1/2019</a:t>
             </a:fld>
             <a:endParaRPr lang="en-US" dirty="0"/>
           </a:p>
@@ -2562,7 +2562,7 @@
             <a:fld id="{B61BEF0D-F0BB-DE4B-95CE-6DB70DBA9567}" type="datetimeFigureOut">
               <a:rPr lang="en-US" smtClean="0"/>
               <a:pPr/>
-              <a:t>4/21/2019</a:t>
+              <a:t>5/1/2019</a:t>
             </a:fld>
             <a:endParaRPr lang="en-US" dirty="0"/>
           </a:p>
@@ -2834,7 +2834,7 @@
             <a:fld id="{B61BEF0D-F0BB-DE4B-95CE-6DB70DBA9567}" type="datetimeFigureOut">
               <a:rPr lang="en-US" smtClean="0"/>
               <a:pPr/>
-              <a:t>4/21/2019</a:t>
+              <a:t>5/1/2019</a:t>
             </a:fld>
             <a:endParaRPr lang="en-US" dirty="0"/>
           </a:p>
@@ -3083,7 +3083,7 @@
             <a:fld id="{B61BEF0D-F0BB-DE4B-95CE-6DB70DBA9567}" type="datetimeFigureOut">
               <a:rPr lang="en-US" smtClean="0"/>
               <a:pPr/>
-              <a:t>4/21/2019</a:t>
+              <a:t>5/1/2019</a:t>
             </a:fld>
             <a:endParaRPr lang="en-US" dirty="0"/>
           </a:p>
@@ -3291,7 +3291,7 @@
             <a:fld id="{B61BEF0D-F0BB-DE4B-95CE-6DB70DBA9567}" type="datetimeFigureOut">
               <a:rPr lang="en-US" smtClean="0"/>
               <a:pPr/>
-              <a:t>4/21/2019</a:t>
+              <a:t>5/1/2019</a:t>
             </a:fld>
             <a:endParaRPr lang="en-US" dirty="0"/>
           </a:p>
@@ -3778,6 +3778,65 @@
           </a:p>
         </p:txBody>
       </p:sp>
+      <p:sp>
+        <p:nvSpPr>
+          <p:cNvPr id="2" name="TextBox 1">
+            <a:extLst>
+              <a:ext uri="{FF2B5EF4-FFF2-40B4-BE49-F238E27FC236}">
+                <a16:creationId xmlns:a16="http://schemas.microsoft.com/office/drawing/2014/main" id="{FA6F561C-3D73-4020-BFFA-3791B79E0801}"/>
+              </a:ext>
+            </a:extLst>
+          </p:cNvPr>
+          <p:cNvSpPr txBox="1"/>
+          <p:nvPr/>
+        </p:nvSpPr>
+        <p:spPr>
+          <a:xfrm>
+            <a:off x="3700491" y="6362472"/>
+            <a:ext cx="4791018" cy="369332"/>
+          </a:xfrm>
+          <a:prstGeom prst="rect">
+            <a:avLst/>
+          </a:prstGeom>
+          <a:noFill/>
+        </p:spPr>
+        <p:txBody>
+          <a:bodyPr wrap="square" rtlCol="0">
+            <a:spAutoFit/>
+          </a:bodyPr>
+          <a:lstStyle/>
+          <a:p>
+            <a:pPr algn="ctr"/>
+            <a:r>
+              <a:rPr lang="en-GB" dirty="0">
+                <a:solidFill>
+                  <a:schemeClr val="bg1">
+                    <a:lumMod val="50000"/>
+                  </a:schemeClr>
+                </a:solidFill>
+              </a:rPr>
+              <a:t>        Chris Gardner | @</a:t>
+            </a:r>
+            <a:r>
+              <a:rPr lang="en-GB" dirty="0" err="1">
+                <a:solidFill>
+                  <a:schemeClr val="bg1">
+                    <a:lumMod val="50000"/>
+                  </a:schemeClr>
+                </a:solidFill>
+              </a:rPr>
+              <a:t>halbaradkenafin</a:t>
+            </a:r>
+            <a:endParaRPr lang="en-GB" dirty="0">
+              <a:solidFill>
+                <a:schemeClr val="bg1">
+                  <a:lumMod val="50000"/>
+                </a:schemeClr>
+              </a:solidFill>
+            </a:endParaRPr>
+          </a:p>
+        </p:txBody>
+      </p:sp>
     </p:spTree>
     <p:extLst>
       <p:ext uri="{BB962C8B-B14F-4D97-AF65-F5344CB8AC3E}">
@@ -4005,6 +4064,65 @@
           </a:p>
         </p:txBody>
       </p:sp>
+      <p:sp>
+        <p:nvSpPr>
+          <p:cNvPr id="7" name="TextBox 6">
+            <a:extLst>
+              <a:ext uri="{FF2B5EF4-FFF2-40B4-BE49-F238E27FC236}">
+                <a16:creationId xmlns:a16="http://schemas.microsoft.com/office/drawing/2014/main" id="{FA086D72-CE00-434E-9CB8-D6D78D0E038C}"/>
+              </a:ext>
+            </a:extLst>
+          </p:cNvPr>
+          <p:cNvSpPr txBox="1"/>
+          <p:nvPr/>
+        </p:nvSpPr>
+        <p:spPr>
+          <a:xfrm>
+            <a:off x="3700491" y="6362472"/>
+            <a:ext cx="4791018" cy="369332"/>
+          </a:xfrm>
+          <a:prstGeom prst="rect">
+            <a:avLst/>
+          </a:prstGeom>
+          <a:noFill/>
+        </p:spPr>
+        <p:txBody>
+          <a:bodyPr wrap="square" rtlCol="0">
+            <a:spAutoFit/>
+          </a:bodyPr>
+          <a:lstStyle/>
+          <a:p>
+            <a:pPr algn="ctr"/>
+            <a:r>
+              <a:rPr lang="en-GB" dirty="0">
+                <a:solidFill>
+                  <a:schemeClr val="bg1">
+                    <a:lumMod val="50000"/>
+                  </a:schemeClr>
+                </a:solidFill>
+              </a:rPr>
+              <a:t>        Chris Gardner | @</a:t>
+            </a:r>
+            <a:r>
+              <a:rPr lang="en-GB" dirty="0" err="1">
+                <a:solidFill>
+                  <a:schemeClr val="bg1">
+                    <a:lumMod val="50000"/>
+                  </a:schemeClr>
+                </a:solidFill>
+              </a:rPr>
+              <a:t>halbaradkenafin</a:t>
+            </a:r>
+            <a:endParaRPr lang="en-GB" dirty="0">
+              <a:solidFill>
+                <a:schemeClr val="bg1">
+                  <a:lumMod val="50000"/>
+                </a:schemeClr>
+              </a:solidFill>
+            </a:endParaRPr>
+          </a:p>
+        </p:txBody>
+      </p:sp>
     </p:spTree>
     <p:extLst>
       <p:ext uri="{BB962C8B-B14F-4D97-AF65-F5344CB8AC3E}">
@@ -4027,9 +4145,6 @@
                     <p:cTn id="3" fill="hold">
                       <p:stCondLst>
                         <p:cond delay="indefinite"/>
-                        <p:cond evt="onBegin" delay="0">
-                          <p:tn val="2"/>
-                        </p:cond>
                       </p:stCondLst>
                       <p:childTnLst>
                         <p:par>
@@ -4039,7 +4154,7 @@
                             </p:stCondLst>
                             <p:childTnLst>
                               <p:par>
-                                <p:cTn id="5" presetID="1" presetClass="entr" presetSubtype="0" fill="hold" grpId="0" nodeType="withEffect">
+                                <p:cTn id="5" presetID="1" presetClass="entr" presetSubtype="0" fill="hold" grpId="0" nodeType="clickEffect">
                                   <p:stCondLst>
                                     <p:cond delay="0"/>
                                   </p:stCondLst>
@@ -4288,6 +4403,167 @@
           </a:p>
         </p:txBody>
       </p:sp>
+      <p:pic>
+        <p:nvPicPr>
+          <p:cNvPr id="5" name="Picture 4">
+            <a:extLst>
+              <a:ext uri="{FF2B5EF4-FFF2-40B4-BE49-F238E27FC236}">
+                <a16:creationId xmlns:a16="http://schemas.microsoft.com/office/drawing/2014/main" id="{94856AB0-8641-4187-8D99-0AE3B75FE8AC}"/>
+              </a:ext>
+            </a:extLst>
+          </p:cNvPr>
+          <p:cNvPicPr>
+            <a:picLocks noChangeAspect="1"/>
+          </p:cNvPicPr>
+          <p:nvPr/>
+        </p:nvPicPr>
+        <p:blipFill>
+          <a:blip r:embed="rId3"/>
+          <a:stretch>
+            <a:fillRect/>
+          </a:stretch>
+        </p:blipFill>
+        <p:spPr>
+          <a:xfrm>
+            <a:off x="8541176" y="2287290"/>
+            <a:ext cx="3804107" cy="3632961"/>
+          </a:xfrm>
+          <a:prstGeom prst="rect">
+            <a:avLst/>
+          </a:prstGeom>
+        </p:spPr>
+      </p:pic>
+      <p:sp>
+        <p:nvSpPr>
+          <p:cNvPr id="4" name="TextBox 3">
+            <a:extLst>
+              <a:ext uri="{FF2B5EF4-FFF2-40B4-BE49-F238E27FC236}">
+                <a16:creationId xmlns:a16="http://schemas.microsoft.com/office/drawing/2014/main" id="{57F8560F-DA4B-4EA4-BAAC-854B678DA18A}"/>
+              </a:ext>
+            </a:extLst>
+          </p:cNvPr>
+          <p:cNvSpPr txBox="1"/>
+          <p:nvPr/>
+        </p:nvSpPr>
+        <p:spPr>
+          <a:xfrm>
+            <a:off x="7353528" y="1825625"/>
+            <a:ext cx="4938855" cy="461665"/>
+          </a:xfrm>
+          <a:prstGeom prst="rect">
+            <a:avLst/>
+          </a:prstGeom>
+          <a:noFill/>
+        </p:spPr>
+        <p:txBody>
+          <a:bodyPr wrap="square" rtlCol="0">
+            <a:spAutoFit/>
+          </a:bodyPr>
+          <a:lstStyle/>
+          <a:p>
+            <a:pPr algn="ctr"/>
+            <a:r>
+              <a:rPr lang="en-GB" sz="2400" dirty="0"/>
+              <a:t>You’re using Source Control</a:t>
+            </a:r>
+          </a:p>
+        </p:txBody>
+      </p:sp>
+      <p:sp>
+        <p:nvSpPr>
+          <p:cNvPr id="6" name="TextBox 5">
+            <a:extLst>
+              <a:ext uri="{FF2B5EF4-FFF2-40B4-BE49-F238E27FC236}">
+                <a16:creationId xmlns:a16="http://schemas.microsoft.com/office/drawing/2014/main" id="{6E30D4C0-60CA-4283-A7F7-F2BBBAEE1A51}"/>
+              </a:ext>
+            </a:extLst>
+          </p:cNvPr>
+          <p:cNvSpPr txBox="1"/>
+          <p:nvPr/>
+        </p:nvSpPr>
+        <p:spPr>
+          <a:xfrm>
+            <a:off x="7406428" y="6176963"/>
+            <a:ext cx="4938855" cy="461665"/>
+          </a:xfrm>
+          <a:prstGeom prst="rect">
+            <a:avLst/>
+          </a:prstGeom>
+          <a:noFill/>
+        </p:spPr>
+        <p:txBody>
+          <a:bodyPr wrap="square" rtlCol="0">
+            <a:spAutoFit/>
+          </a:bodyPr>
+          <a:lstStyle/>
+          <a:p>
+            <a:pPr algn="ctr"/>
+            <a:r>
+              <a:rPr lang="en-GB" sz="2400" dirty="0"/>
+              <a:t>But it’s script.v2.bak.ps1.old</a:t>
+            </a:r>
+          </a:p>
+        </p:txBody>
+      </p:sp>
+      <p:sp>
+        <p:nvSpPr>
+          <p:cNvPr id="7" name="TextBox 6">
+            <a:extLst>
+              <a:ext uri="{FF2B5EF4-FFF2-40B4-BE49-F238E27FC236}">
+                <a16:creationId xmlns:a16="http://schemas.microsoft.com/office/drawing/2014/main" id="{A382C761-074A-4208-B531-96DE30938834}"/>
+              </a:ext>
+            </a:extLst>
+          </p:cNvPr>
+          <p:cNvSpPr txBox="1"/>
+          <p:nvPr/>
+        </p:nvSpPr>
+        <p:spPr>
+          <a:xfrm>
+            <a:off x="3700491" y="6362472"/>
+            <a:ext cx="4791018" cy="369332"/>
+          </a:xfrm>
+          <a:prstGeom prst="rect">
+            <a:avLst/>
+          </a:prstGeom>
+          <a:noFill/>
+        </p:spPr>
+        <p:txBody>
+          <a:bodyPr wrap="square" rtlCol="0">
+            <a:spAutoFit/>
+          </a:bodyPr>
+          <a:lstStyle/>
+          <a:p>
+            <a:pPr algn="ctr"/>
+            <a:r>
+              <a:rPr lang="en-GB" dirty="0">
+                <a:solidFill>
+                  <a:schemeClr val="bg1">
+                    <a:lumMod val="50000"/>
+                  </a:schemeClr>
+                </a:solidFill>
+              </a:rPr>
+              <a:t>        Chris Gardner | @</a:t>
+            </a:r>
+            <a:r>
+              <a:rPr lang="en-GB" dirty="0" err="1">
+                <a:solidFill>
+                  <a:schemeClr val="bg1">
+                    <a:lumMod val="50000"/>
+                  </a:schemeClr>
+                </a:solidFill>
+              </a:rPr>
+              <a:t>halbaradkenafin</a:t>
+            </a:r>
+            <a:endParaRPr lang="en-GB" dirty="0">
+              <a:solidFill>
+                <a:schemeClr val="bg1">
+                  <a:lumMod val="50000"/>
+                </a:schemeClr>
+              </a:solidFill>
+            </a:endParaRPr>
+          </a:p>
+        </p:txBody>
+      </p:sp>
     </p:spTree>
     <p:extLst>
       <p:ext uri="{BB962C8B-B14F-4D97-AF65-F5344CB8AC3E}">
@@ -4337,6 +4613,65 @@
           </a:p>
         </p:txBody>
       </p:sp>
+      <p:sp>
+        <p:nvSpPr>
+          <p:cNvPr id="3" name="TextBox 2">
+            <a:extLst>
+              <a:ext uri="{FF2B5EF4-FFF2-40B4-BE49-F238E27FC236}">
+                <a16:creationId xmlns:a16="http://schemas.microsoft.com/office/drawing/2014/main" id="{2F86B66B-2A14-4B0D-9821-C99B7634E22A}"/>
+              </a:ext>
+            </a:extLst>
+          </p:cNvPr>
+          <p:cNvSpPr txBox="1"/>
+          <p:nvPr/>
+        </p:nvSpPr>
+        <p:spPr>
+          <a:xfrm>
+            <a:off x="3700491" y="6362472"/>
+            <a:ext cx="4791018" cy="369332"/>
+          </a:xfrm>
+          <a:prstGeom prst="rect">
+            <a:avLst/>
+          </a:prstGeom>
+          <a:noFill/>
+        </p:spPr>
+        <p:txBody>
+          <a:bodyPr wrap="square" rtlCol="0">
+            <a:spAutoFit/>
+          </a:bodyPr>
+          <a:lstStyle/>
+          <a:p>
+            <a:pPr algn="ctr"/>
+            <a:r>
+              <a:rPr lang="en-GB" dirty="0">
+                <a:solidFill>
+                  <a:schemeClr val="bg1">
+                    <a:lumMod val="50000"/>
+                  </a:schemeClr>
+                </a:solidFill>
+              </a:rPr>
+              <a:t>        Chris Gardner | @</a:t>
+            </a:r>
+            <a:r>
+              <a:rPr lang="en-GB" dirty="0" err="1">
+                <a:solidFill>
+                  <a:schemeClr val="bg1">
+                    <a:lumMod val="50000"/>
+                  </a:schemeClr>
+                </a:solidFill>
+              </a:rPr>
+              <a:t>halbaradkenafin</a:t>
+            </a:r>
+            <a:endParaRPr lang="en-GB" dirty="0">
+              <a:solidFill>
+                <a:schemeClr val="bg1">
+                  <a:lumMod val="50000"/>
+                </a:schemeClr>
+              </a:solidFill>
+            </a:endParaRPr>
+          </a:p>
+        </p:txBody>
+      </p:sp>
     </p:spTree>
     <p:extLst>
       <p:ext uri="{BB962C8B-B14F-4D97-AF65-F5344CB8AC3E}">
@@ -4413,7 +4748,9 @@
         </p:nvSpPr>
         <p:spPr/>
         <p:txBody>
-          <a:bodyPr/>
+          <a:bodyPr>
+            <a:normAutofit/>
+          </a:bodyPr>
           <a:lstStyle/>
           <a:p>
             <a:r>
@@ -4446,6 +4783,23 @@
             <a:endParaRPr lang="en-GB" dirty="0"/>
           </a:p>
           <a:p>
+            <a:r>
+              <a:rPr lang="en-GB" dirty="0"/>
+              <a:t>Twitter: @</a:t>
+            </a:r>
+            <a:r>
+              <a:rPr lang="en-GB" dirty="0" err="1"/>
+              <a:t>halbaradkenafin</a:t>
+            </a:r>
+            <a:endParaRPr lang="en-GB" dirty="0"/>
+          </a:p>
+          <a:p>
+            <a:pPr marL="457200" lvl="1" indent="0">
+              <a:buNone/>
+            </a:pPr>
+            <a:endParaRPr lang="en-GB" dirty="0"/>
+          </a:p>
+          <a:p>
             <a:pPr lvl="1"/>
             <a:endParaRPr lang="en-GB" dirty="0"/>
           </a:p>
@@ -4503,6 +4857,65 @@
           </a:p>
           <a:p>
             <a:endParaRPr lang="en-GB" dirty="0"/>
+          </a:p>
+        </p:txBody>
+      </p:sp>
+      <p:sp>
+        <p:nvSpPr>
+          <p:cNvPr id="4" name="TextBox 3">
+            <a:extLst>
+              <a:ext uri="{FF2B5EF4-FFF2-40B4-BE49-F238E27FC236}">
+                <a16:creationId xmlns:a16="http://schemas.microsoft.com/office/drawing/2014/main" id="{2137B5C7-75ED-4B79-9140-E82BDD161272}"/>
+              </a:ext>
+            </a:extLst>
+          </p:cNvPr>
+          <p:cNvSpPr txBox="1"/>
+          <p:nvPr/>
+        </p:nvSpPr>
+        <p:spPr>
+          <a:xfrm>
+            <a:off x="3700491" y="6362472"/>
+            <a:ext cx="4791018" cy="369332"/>
+          </a:xfrm>
+          <a:prstGeom prst="rect">
+            <a:avLst/>
+          </a:prstGeom>
+          <a:noFill/>
+        </p:spPr>
+        <p:txBody>
+          <a:bodyPr wrap="square" rtlCol="0">
+            <a:spAutoFit/>
+          </a:bodyPr>
+          <a:lstStyle/>
+          <a:p>
+            <a:pPr algn="ctr"/>
+            <a:r>
+              <a:rPr lang="en-GB" dirty="0">
+                <a:solidFill>
+                  <a:schemeClr val="bg1">
+                    <a:lumMod val="50000"/>
+                  </a:schemeClr>
+                </a:solidFill>
+              </a:rPr>
+              <a:t>        Chris Gardner | @</a:t>
+            </a:r>
+            <a:r>
+              <a:rPr lang="en-GB" dirty="0" err="1">
+                <a:solidFill>
+                  <a:schemeClr val="bg1">
+                    <a:lumMod val="50000"/>
+                  </a:schemeClr>
+                </a:solidFill>
+              </a:rPr>
+              <a:t>halbaradkenafin</a:t>
+            </a:r>
+            <a:endParaRPr lang="en-GB" dirty="0">
+              <a:solidFill>
+                <a:schemeClr val="bg1">
+                  <a:lumMod val="50000"/>
+                </a:schemeClr>
+              </a:solidFill>
+            </a:endParaRPr>
           </a:p>
         </p:txBody>
       </p:sp>
@@ -4536,6 +4949,65 @@
           <a:chExt cx="0" cy="0"/>
         </a:xfrm>
       </p:grpSpPr>
+      <p:sp>
+        <p:nvSpPr>
+          <p:cNvPr id="2" name="TextBox 1">
+            <a:extLst>
+              <a:ext uri="{FF2B5EF4-FFF2-40B4-BE49-F238E27FC236}">
+                <a16:creationId xmlns:a16="http://schemas.microsoft.com/office/drawing/2014/main" id="{FCF38032-5766-4B9E-B225-6DC217337D65}"/>
+              </a:ext>
+            </a:extLst>
+          </p:cNvPr>
+          <p:cNvSpPr txBox="1"/>
+          <p:nvPr/>
+        </p:nvSpPr>
+        <p:spPr>
+          <a:xfrm>
+            <a:off x="3700491" y="6362472"/>
+            <a:ext cx="4791018" cy="369332"/>
+          </a:xfrm>
+          <a:prstGeom prst="rect">
+            <a:avLst/>
+          </a:prstGeom>
+          <a:noFill/>
+        </p:spPr>
+        <p:txBody>
+          <a:bodyPr wrap="square" rtlCol="0">
+            <a:spAutoFit/>
+          </a:bodyPr>
+          <a:lstStyle/>
+          <a:p>
+            <a:pPr algn="ctr"/>
+            <a:r>
+              <a:rPr lang="en-GB" dirty="0">
+                <a:solidFill>
+                  <a:schemeClr val="bg1">
+                    <a:lumMod val="50000"/>
+                  </a:schemeClr>
+                </a:solidFill>
+              </a:rPr>
+              <a:t>        Chris Gardner | @</a:t>
+            </a:r>
+            <a:r>
+              <a:rPr lang="en-GB" dirty="0" err="1">
+                <a:solidFill>
+                  <a:schemeClr val="bg1">
+                    <a:lumMod val="50000"/>
+                  </a:schemeClr>
+                </a:solidFill>
+              </a:rPr>
+              <a:t>halbaradkenafin</a:t>
+            </a:r>
+            <a:endParaRPr lang="en-GB" dirty="0">
+              <a:solidFill>
+                <a:schemeClr val="bg1">
+                  <a:lumMod val="50000"/>
+                </a:schemeClr>
+              </a:solidFill>
+            </a:endParaRPr>
+          </a:p>
+        </p:txBody>
+      </p:sp>
     </p:spTree>
     <p:extLst>
       <p:ext uri="{BB962C8B-B14F-4D97-AF65-F5344CB8AC3E}">

</xml_diff>